<commit_message>
saved updated powerpoint deck
</commit_message>
<xml_diff>
--- a/input/images/source/clinicalreasoning-module-resources.pptx
+++ b/input/images/source/clinicalreasoning-module-resources.pptx
@@ -253,7 +253,7 @@
           <a:p>
             <a:fld id="{79B19490-57C7-44C6-A80B-21AF9873DCB2}" type="datetimeFigureOut">
               <a:rPr lang="en-US" smtClean="0"/>
-              <a:t>8/25/2022</a:t>
+              <a:t>11/20/24</a:t>
             </a:fld>
             <a:endParaRPr lang="en-US"/>
           </a:p>
@@ -421,7 +421,7 @@
           <a:p>
             <a:fld id="{79B19490-57C7-44C6-A80B-21AF9873DCB2}" type="datetimeFigureOut">
               <a:rPr lang="en-US" smtClean="0"/>
-              <a:t>8/25/2022</a:t>
+              <a:t>11/20/24</a:t>
             </a:fld>
             <a:endParaRPr lang="en-US"/>
           </a:p>
@@ -599,7 +599,7 @@
           <a:p>
             <a:fld id="{79B19490-57C7-44C6-A80B-21AF9873DCB2}" type="datetimeFigureOut">
               <a:rPr lang="en-US" smtClean="0"/>
-              <a:t>8/25/2022</a:t>
+              <a:t>11/20/24</a:t>
             </a:fld>
             <a:endParaRPr lang="en-US"/>
           </a:p>
@@ -767,7 +767,7 @@
           <a:p>
             <a:fld id="{79B19490-57C7-44C6-A80B-21AF9873DCB2}" type="datetimeFigureOut">
               <a:rPr lang="en-US" smtClean="0"/>
-              <a:t>8/25/2022</a:t>
+              <a:t>11/20/24</a:t>
             </a:fld>
             <a:endParaRPr lang="en-US"/>
           </a:p>
@@ -1012,7 +1012,7 @@
           <a:p>
             <a:fld id="{79B19490-57C7-44C6-A80B-21AF9873DCB2}" type="datetimeFigureOut">
               <a:rPr lang="en-US" smtClean="0"/>
-              <a:t>8/25/2022</a:t>
+              <a:t>11/20/24</a:t>
             </a:fld>
             <a:endParaRPr lang="en-US"/>
           </a:p>
@@ -1241,7 +1241,7 @@
           <a:p>
             <a:fld id="{79B19490-57C7-44C6-A80B-21AF9873DCB2}" type="datetimeFigureOut">
               <a:rPr lang="en-US" smtClean="0"/>
-              <a:t>8/25/2022</a:t>
+              <a:t>11/20/24</a:t>
             </a:fld>
             <a:endParaRPr lang="en-US"/>
           </a:p>
@@ -1605,7 +1605,7 @@
           <a:p>
             <a:fld id="{79B19490-57C7-44C6-A80B-21AF9873DCB2}" type="datetimeFigureOut">
               <a:rPr lang="en-US" smtClean="0"/>
-              <a:t>8/25/2022</a:t>
+              <a:t>11/20/24</a:t>
             </a:fld>
             <a:endParaRPr lang="en-US"/>
           </a:p>
@@ -1722,7 +1722,7 @@
           <a:p>
             <a:fld id="{79B19490-57C7-44C6-A80B-21AF9873DCB2}" type="datetimeFigureOut">
               <a:rPr lang="en-US" smtClean="0"/>
-              <a:t>8/25/2022</a:t>
+              <a:t>11/20/24</a:t>
             </a:fld>
             <a:endParaRPr lang="en-US"/>
           </a:p>
@@ -1817,7 +1817,7 @@
           <a:p>
             <a:fld id="{79B19490-57C7-44C6-A80B-21AF9873DCB2}" type="datetimeFigureOut">
               <a:rPr lang="en-US" smtClean="0"/>
-              <a:t>8/25/2022</a:t>
+              <a:t>11/20/24</a:t>
             </a:fld>
             <a:endParaRPr lang="en-US"/>
           </a:p>
@@ -2092,7 +2092,7 @@
           <a:p>
             <a:fld id="{79B19490-57C7-44C6-A80B-21AF9873DCB2}" type="datetimeFigureOut">
               <a:rPr lang="en-US" smtClean="0"/>
-              <a:t>8/25/2022</a:t>
+              <a:t>11/20/24</a:t>
             </a:fld>
             <a:endParaRPr lang="en-US"/>
           </a:p>
@@ -2344,7 +2344,7 @@
           <a:p>
             <a:fld id="{79B19490-57C7-44C6-A80B-21AF9873DCB2}" type="datetimeFigureOut">
               <a:rPr lang="en-US" smtClean="0"/>
-              <a:t>8/25/2022</a:t>
+              <a:t>11/20/24</a:t>
             </a:fld>
             <a:endParaRPr lang="en-US"/>
           </a:p>
@@ -2555,7 +2555,7 @@
           <a:p>
             <a:fld id="{79B19490-57C7-44C6-A80B-21AF9873DCB2}" type="datetimeFigureOut">
               <a:rPr lang="en-US" smtClean="0"/>
-              <a:t>8/25/2022</a:t>
+              <a:t>11/20/24</a:t>
             </a:fld>
             <a:endParaRPr lang="en-US"/>
           </a:p>
@@ -13758,1012 +13758,1036 @@
           <a:chExt cx="0" cy="0"/>
         </a:xfrm>
       </p:grpSpPr>
-      <p:grpSp>
-        <p:nvGrpSpPr>
-          <p:cNvPr id="54" name="Group 53"/>
-          <p:cNvGrpSpPr/>
-          <p:nvPr/>
-        </p:nvGrpSpPr>
-        <p:grpSpPr>
+      <p:sp>
+        <p:nvSpPr>
+          <p:cNvPr id="4" name="Rectangle 3">
+            <a:extLst>
+              <a:ext uri="{FF2B5EF4-FFF2-40B4-BE49-F238E27FC236}">
+                <a16:creationId xmlns:a16="http://schemas.microsoft.com/office/drawing/2014/main" id="{C238DE40-B651-CCA9-89F3-B03477D871E6}"/>
+              </a:ext>
+            </a:extLst>
+          </p:cNvPr>
+          <p:cNvSpPr/>
+          <p:nvPr/>
+        </p:nvSpPr>
+        <p:spPr>
+          <a:xfrm>
+            <a:off x="4452628" y="646810"/>
+            <a:ext cx="4135582" cy="2070502"/>
+          </a:xfrm>
+          <a:prstGeom prst="rect">
+            <a:avLst/>
+          </a:prstGeom>
+          <a:solidFill>
+            <a:schemeClr val="accent2">
+              <a:lumMod val="20000"/>
+              <a:lumOff val="80000"/>
+            </a:schemeClr>
+          </a:solidFill>
+        </p:spPr>
+        <p:style>
+          <a:lnRef idx="2">
+            <a:schemeClr val="accent1">
+              <a:shade val="15000"/>
+            </a:schemeClr>
+          </a:lnRef>
+          <a:fillRef idx="1">
+            <a:schemeClr val="accent1"/>
+          </a:fillRef>
+          <a:effectRef idx="0">
+            <a:schemeClr val="accent1"/>
+          </a:effectRef>
+          <a:fontRef idx="minor">
+            <a:schemeClr val="lt1"/>
+          </a:fontRef>
+        </p:style>
+        <p:txBody>
+          <a:bodyPr rtlCol="0" anchor="ctr"/>
+          <a:lstStyle/>
+          <a:p>
+            <a:pPr algn="ctr"/>
+            <a:endParaRPr lang="en-US"/>
+          </a:p>
+        </p:txBody>
+      </p:sp>
+      <p:sp>
+        <p:nvSpPr>
+          <p:cNvPr id="28" name="Rectangle 27"/>
+          <p:cNvSpPr/>
+          <p:nvPr/>
+        </p:nvSpPr>
+        <p:spPr>
           <a:xfrm>
             <a:off x="1961567" y="516366"/>
             <a:ext cx="2216075" cy="2969111"/>
-            <a:chOff x="3078480" y="645457"/>
-            <a:chExt cx="2216075" cy="2969111"/>
-          </a:xfrm>
-        </p:grpSpPr>
-        <p:grpSp>
-          <p:nvGrpSpPr>
-            <p:cNvPr id="44" name="Group 43"/>
-            <p:cNvGrpSpPr/>
-            <p:nvPr/>
-          </p:nvGrpSpPr>
-          <p:grpSpPr>
-            <a:xfrm>
-              <a:off x="3078480" y="645457"/>
-              <a:ext cx="2216075" cy="2969111"/>
-              <a:chOff x="3078480" y="645457"/>
-              <a:chExt cx="2216075" cy="2969111"/>
-            </a:xfrm>
-          </p:grpSpPr>
-          <p:sp>
-            <p:nvSpPr>
-              <p:cNvPr id="28" name="Rectangle 27"/>
-              <p:cNvSpPr/>
-              <p:nvPr/>
-            </p:nvSpPr>
-            <p:spPr>
-              <a:xfrm>
-                <a:off x="3078480" y="645457"/>
-                <a:ext cx="2216075" cy="2969111"/>
-              </a:xfrm>
-              <a:prstGeom prst="rect">
-                <a:avLst/>
-              </a:prstGeom>
-              <a:solidFill>
-                <a:schemeClr val="accent1">
-                  <a:lumMod val="20000"/>
-                  <a:lumOff val="80000"/>
-                </a:schemeClr>
-              </a:solidFill>
-            </p:spPr>
-            <p:style>
-              <a:lnRef idx="2">
-                <a:schemeClr val="accent1">
-                  <a:shade val="50000"/>
-                </a:schemeClr>
-              </a:lnRef>
-              <a:fillRef idx="1">
-                <a:schemeClr val="accent1"/>
-              </a:fillRef>
-              <a:effectRef idx="0">
-                <a:schemeClr val="accent1"/>
-              </a:effectRef>
-              <a:fontRef idx="minor">
-                <a:schemeClr val="lt1"/>
-              </a:fontRef>
-            </p:style>
-            <p:txBody>
-              <a:bodyPr rtlCol="0" anchor="ctr"/>
-              <a:lstStyle/>
-              <a:p>
-                <a:pPr algn="ctr"/>
-                <a:endParaRPr lang="en-US" sz="1200"/>
-              </a:p>
-            </p:txBody>
-          </p:sp>
-          <p:sp>
-            <p:nvSpPr>
-              <p:cNvPr id="29" name="TextBox 28"/>
-              <p:cNvSpPr txBox="1"/>
-              <p:nvPr/>
-            </p:nvSpPr>
-            <p:spPr>
-              <a:xfrm>
-                <a:off x="3078480" y="645457"/>
-                <a:ext cx="2216075" cy="276999"/>
-              </a:xfrm>
-              <a:prstGeom prst="rect">
-                <a:avLst/>
-              </a:prstGeom>
-              <a:noFill/>
-            </p:spPr>
-            <p:txBody>
-              <a:bodyPr wrap="square" rtlCol="0">
-                <a:spAutoFit/>
-              </a:bodyPr>
-              <a:lstStyle/>
-              <a:p>
-                <a:r>
-                  <a:rPr lang="en-US" sz="1200" dirty="0" err="1"/>
-                  <a:t>MeasureReport</a:t>
-                </a:r>
-                <a:r>
-                  <a:rPr lang="en-US" sz="1200" dirty="0"/>
-                  <a:t> – Patient-Listing</a:t>
-                </a:r>
-              </a:p>
-            </p:txBody>
-          </p:sp>
-          <p:sp>
-            <p:nvSpPr>
-              <p:cNvPr id="30" name="Rectangle 29"/>
-              <p:cNvSpPr/>
-              <p:nvPr/>
-            </p:nvSpPr>
-            <p:spPr>
-              <a:xfrm>
-                <a:off x="3304940" y="905699"/>
-                <a:ext cx="1989615" cy="1909445"/>
-              </a:xfrm>
-              <a:prstGeom prst="rect">
-                <a:avLst/>
-              </a:prstGeom>
-              <a:solidFill>
-                <a:schemeClr val="accent1">
-                  <a:lumMod val="40000"/>
-                  <a:lumOff val="60000"/>
-                </a:schemeClr>
-              </a:solidFill>
-            </p:spPr>
-            <p:style>
-              <a:lnRef idx="2">
-                <a:schemeClr val="accent1">
-                  <a:shade val="50000"/>
-                </a:schemeClr>
-              </a:lnRef>
-              <a:fillRef idx="1">
-                <a:schemeClr val="accent1"/>
-              </a:fillRef>
-              <a:effectRef idx="0">
-                <a:schemeClr val="accent1"/>
-              </a:effectRef>
-              <a:fontRef idx="minor">
-                <a:schemeClr val="lt1"/>
-              </a:fontRef>
-            </p:style>
-            <p:txBody>
-              <a:bodyPr rtlCol="0" anchor="ctr"/>
-              <a:lstStyle/>
-              <a:p>
-                <a:pPr algn="ctr"/>
-                <a:endParaRPr lang="en-US" sz="1200" dirty="0"/>
-              </a:p>
-            </p:txBody>
-          </p:sp>
-          <p:sp>
-            <p:nvSpPr>
-              <p:cNvPr id="31" name="TextBox 30"/>
-              <p:cNvSpPr txBox="1"/>
-              <p:nvPr/>
-            </p:nvSpPr>
-            <p:spPr>
-              <a:xfrm>
-                <a:off x="3304939" y="905698"/>
-                <a:ext cx="1989615" cy="241936"/>
-              </a:xfrm>
-              <a:prstGeom prst="rect">
-                <a:avLst/>
-              </a:prstGeom>
-              <a:noFill/>
-            </p:spPr>
-            <p:txBody>
-              <a:bodyPr wrap="square" rtlCol="0">
-                <a:spAutoFit/>
-              </a:bodyPr>
-              <a:lstStyle/>
-              <a:p>
-                <a:r>
-                  <a:rPr lang="en-US" sz="1200" dirty="0"/>
-                  <a:t>Population Group</a:t>
-                </a:r>
-              </a:p>
-            </p:txBody>
-          </p:sp>
-          <p:sp>
-            <p:nvSpPr>
-              <p:cNvPr id="32" name="Rectangle 31"/>
-              <p:cNvSpPr/>
-              <p:nvPr/>
-            </p:nvSpPr>
-            <p:spPr>
-              <a:xfrm>
-                <a:off x="3579927" y="1154110"/>
-                <a:ext cx="1714627" cy="816210"/>
-              </a:xfrm>
-              <a:prstGeom prst="rect">
-                <a:avLst/>
-              </a:prstGeom>
-              <a:solidFill>
-                <a:schemeClr val="accent1">
-                  <a:lumMod val="60000"/>
-                  <a:lumOff val="40000"/>
-                </a:schemeClr>
-              </a:solidFill>
-            </p:spPr>
-            <p:style>
-              <a:lnRef idx="2">
-                <a:schemeClr val="accent1">
-                  <a:shade val="50000"/>
-                </a:schemeClr>
-              </a:lnRef>
-              <a:fillRef idx="1">
-                <a:schemeClr val="accent1"/>
-              </a:fillRef>
-              <a:effectRef idx="0">
-                <a:schemeClr val="accent1"/>
-              </a:effectRef>
-              <a:fontRef idx="minor">
-                <a:schemeClr val="lt1"/>
-              </a:fontRef>
-            </p:style>
-            <p:txBody>
-              <a:bodyPr rtlCol="0" anchor="ctr"/>
-              <a:lstStyle/>
-              <a:p>
-                <a:pPr algn="ctr"/>
-                <a:endParaRPr lang="en-US" sz="1200"/>
-              </a:p>
-            </p:txBody>
-          </p:sp>
-          <p:sp>
-            <p:nvSpPr>
-              <p:cNvPr id="33" name="TextBox 32"/>
-              <p:cNvSpPr txBox="1"/>
-              <p:nvPr/>
-            </p:nvSpPr>
-            <p:spPr>
-              <a:xfrm>
-                <a:off x="3579927" y="1165939"/>
-                <a:ext cx="1714628" cy="241936"/>
-              </a:xfrm>
-              <a:prstGeom prst="rect">
-                <a:avLst/>
-              </a:prstGeom>
-              <a:noFill/>
-            </p:spPr>
-            <p:txBody>
-              <a:bodyPr wrap="square" rtlCol="0">
-                <a:spAutoFit/>
-              </a:bodyPr>
-              <a:lstStyle/>
-              <a:p>
-                <a:r>
-                  <a:rPr lang="en-US" sz="1200" dirty="0"/>
-                  <a:t>Populations</a:t>
-                </a:r>
-              </a:p>
-            </p:txBody>
-          </p:sp>
-          <p:sp>
-            <p:nvSpPr>
-              <p:cNvPr id="34" name="Rectangle 33"/>
-              <p:cNvSpPr/>
-              <p:nvPr/>
-            </p:nvSpPr>
-            <p:spPr>
-              <a:xfrm>
-                <a:off x="3579927" y="2050201"/>
-                <a:ext cx="1714628" cy="764942"/>
-              </a:xfrm>
-              <a:prstGeom prst="rect">
-                <a:avLst/>
-              </a:prstGeom>
-              <a:solidFill>
-                <a:schemeClr val="accent1">
-                  <a:lumMod val="60000"/>
-                  <a:lumOff val="40000"/>
-                </a:schemeClr>
-              </a:solidFill>
-            </p:spPr>
-            <p:style>
-              <a:lnRef idx="2">
-                <a:schemeClr val="accent1">
-                  <a:shade val="50000"/>
-                </a:schemeClr>
-              </a:lnRef>
-              <a:fillRef idx="1">
-                <a:schemeClr val="accent1"/>
-              </a:fillRef>
-              <a:effectRef idx="0">
-                <a:schemeClr val="accent1"/>
-              </a:effectRef>
-              <a:fontRef idx="minor">
-                <a:schemeClr val="lt1"/>
-              </a:fontRef>
-            </p:style>
-            <p:txBody>
-              <a:bodyPr rtlCol="0" anchor="ctr"/>
-              <a:lstStyle/>
-              <a:p>
-                <a:pPr algn="ctr"/>
-                <a:endParaRPr lang="en-US" sz="1200"/>
-              </a:p>
-            </p:txBody>
-          </p:sp>
-          <p:sp>
-            <p:nvSpPr>
-              <p:cNvPr id="35" name="TextBox 34"/>
-              <p:cNvSpPr txBox="1"/>
-              <p:nvPr/>
-            </p:nvSpPr>
-            <p:spPr>
-              <a:xfrm>
-                <a:off x="3579927" y="2066437"/>
-                <a:ext cx="1714628" cy="241936"/>
-              </a:xfrm>
-              <a:prstGeom prst="rect">
-                <a:avLst/>
-              </a:prstGeom>
-              <a:noFill/>
-            </p:spPr>
-            <p:txBody>
-              <a:bodyPr wrap="square" rtlCol="0">
-                <a:spAutoFit/>
-              </a:bodyPr>
-              <a:lstStyle/>
-              <a:p>
-                <a:r>
-                  <a:rPr lang="en-US" sz="1200" dirty="0" err="1"/>
-                  <a:t>Stratifiers</a:t>
-                </a:r>
-                <a:endParaRPr lang="en-US" sz="1200" dirty="0"/>
-              </a:p>
-            </p:txBody>
-          </p:sp>
-          <p:sp>
-            <p:nvSpPr>
-              <p:cNvPr id="36" name="Rectangle 35"/>
-              <p:cNvSpPr/>
-              <p:nvPr/>
-            </p:nvSpPr>
-            <p:spPr>
-              <a:xfrm>
-                <a:off x="3296853" y="2892103"/>
-                <a:ext cx="1997702" cy="722465"/>
-              </a:xfrm>
-              <a:prstGeom prst="rect">
-                <a:avLst/>
-              </a:prstGeom>
-              <a:solidFill>
-                <a:schemeClr val="accent1">
-                  <a:lumMod val="40000"/>
-                  <a:lumOff val="60000"/>
-                </a:schemeClr>
-              </a:solidFill>
-            </p:spPr>
-            <p:style>
-              <a:lnRef idx="2">
-                <a:schemeClr val="accent1">
-                  <a:shade val="50000"/>
-                </a:schemeClr>
-              </a:lnRef>
-              <a:fillRef idx="1">
-                <a:schemeClr val="accent1"/>
-              </a:fillRef>
-              <a:effectRef idx="0">
-                <a:schemeClr val="accent1"/>
-              </a:effectRef>
-              <a:fontRef idx="minor">
-                <a:schemeClr val="lt1"/>
-              </a:fontRef>
-            </p:style>
-            <p:txBody>
-              <a:bodyPr rtlCol="0" anchor="ctr"/>
-              <a:lstStyle/>
-              <a:p>
-                <a:pPr algn="ctr"/>
-                <a:endParaRPr lang="en-US" sz="1200"/>
-              </a:p>
-            </p:txBody>
-          </p:sp>
-          <p:sp>
-            <p:nvSpPr>
-              <p:cNvPr id="37" name="TextBox 36"/>
-              <p:cNvSpPr txBox="1"/>
-              <p:nvPr/>
-            </p:nvSpPr>
-            <p:spPr>
-              <a:xfrm>
-                <a:off x="3296852" y="2900343"/>
-                <a:ext cx="1997702" cy="241936"/>
-              </a:xfrm>
-              <a:prstGeom prst="rect">
-                <a:avLst/>
-              </a:prstGeom>
-              <a:noFill/>
-            </p:spPr>
-            <p:txBody>
-              <a:bodyPr wrap="square" rtlCol="0">
-                <a:spAutoFit/>
-              </a:bodyPr>
-              <a:lstStyle/>
-              <a:p>
-                <a:r>
-                  <a:rPr lang="en-US" sz="1200" dirty="0"/>
-                  <a:t>Supplemental Data</a:t>
-                </a:r>
-              </a:p>
-            </p:txBody>
-          </p:sp>
-          <p:sp>
-            <p:nvSpPr>
-              <p:cNvPr id="38" name="Rounded Rectangle 37"/>
-              <p:cNvSpPr/>
-              <p:nvPr/>
-            </p:nvSpPr>
-            <p:spPr>
-              <a:xfrm>
-                <a:off x="3705289" y="1426192"/>
-                <a:ext cx="659161" cy="426843"/>
-              </a:xfrm>
-              <a:prstGeom prst="roundRect">
-                <a:avLst/>
-              </a:prstGeom>
-              <a:solidFill>
-                <a:schemeClr val="accent1">
-                  <a:lumMod val="75000"/>
-                </a:schemeClr>
-              </a:solidFill>
-            </p:spPr>
-            <p:style>
-              <a:lnRef idx="2">
-                <a:schemeClr val="accent1">
-                  <a:shade val="50000"/>
-                </a:schemeClr>
-              </a:lnRef>
-              <a:fillRef idx="1">
-                <a:schemeClr val="accent1"/>
-              </a:fillRef>
-              <a:effectRef idx="0">
-                <a:schemeClr val="accent1"/>
-              </a:effectRef>
-              <a:fontRef idx="minor">
-                <a:schemeClr val="lt1"/>
-              </a:fontRef>
-            </p:style>
-            <p:txBody>
-              <a:bodyPr rtlCol="0" anchor="ctr"/>
-              <a:lstStyle/>
-              <a:p>
-                <a:pPr algn="ctr"/>
-                <a:r>
-                  <a:rPr lang="en-US" sz="1200" dirty="0"/>
-                  <a:t>500</a:t>
-                </a:r>
-              </a:p>
-            </p:txBody>
-          </p:sp>
-          <p:sp>
-            <p:nvSpPr>
-              <p:cNvPr id="39" name="Rounded Rectangle 38"/>
-              <p:cNvSpPr/>
-              <p:nvPr/>
-            </p:nvSpPr>
-            <p:spPr>
-              <a:xfrm>
-                <a:off x="4489811" y="1433578"/>
-                <a:ext cx="659161" cy="426843"/>
-              </a:xfrm>
-              <a:prstGeom prst="roundRect">
-                <a:avLst/>
-              </a:prstGeom>
-              <a:solidFill>
-                <a:schemeClr val="accent1">
-                  <a:lumMod val="75000"/>
-                </a:schemeClr>
-              </a:solidFill>
-            </p:spPr>
-            <p:style>
-              <a:lnRef idx="2">
-                <a:schemeClr val="accent1">
-                  <a:shade val="50000"/>
-                </a:schemeClr>
-              </a:lnRef>
-              <a:fillRef idx="1">
-                <a:schemeClr val="accent1"/>
-              </a:fillRef>
-              <a:effectRef idx="0">
-                <a:schemeClr val="accent1"/>
-              </a:effectRef>
-              <a:fontRef idx="minor">
-                <a:schemeClr val="lt1"/>
-              </a:fontRef>
-            </p:style>
-            <p:txBody>
-              <a:bodyPr rtlCol="0" anchor="ctr"/>
-              <a:lstStyle/>
-              <a:p>
-                <a:pPr algn="ctr"/>
-                <a:r>
-                  <a:rPr lang="en-US" sz="1200" dirty="0"/>
-                  <a:t>250</a:t>
-                </a:r>
-              </a:p>
-            </p:txBody>
-          </p:sp>
-          <p:sp>
-            <p:nvSpPr>
-              <p:cNvPr id="40" name="Rounded Rectangle 39"/>
-              <p:cNvSpPr/>
-              <p:nvPr/>
-            </p:nvSpPr>
-            <p:spPr>
-              <a:xfrm>
-                <a:off x="3705289" y="2290546"/>
-                <a:ext cx="659161" cy="426843"/>
-              </a:xfrm>
-              <a:prstGeom prst="roundRect">
-                <a:avLst/>
-              </a:prstGeom>
-              <a:solidFill>
-                <a:schemeClr val="accent1">
-                  <a:lumMod val="75000"/>
-                </a:schemeClr>
-              </a:solidFill>
-            </p:spPr>
-            <p:style>
-              <a:lnRef idx="2">
-                <a:schemeClr val="accent1">
-                  <a:shade val="50000"/>
-                </a:schemeClr>
-              </a:lnRef>
-              <a:fillRef idx="1">
-                <a:schemeClr val="accent1"/>
-              </a:fillRef>
-              <a:effectRef idx="0">
-                <a:schemeClr val="accent1"/>
-              </a:effectRef>
-              <a:fontRef idx="minor">
-                <a:schemeClr val="lt1"/>
-              </a:fontRef>
-            </p:style>
-            <p:txBody>
-              <a:bodyPr rtlCol="0" anchor="ctr"/>
-              <a:lstStyle/>
-              <a:p>
-                <a:pPr algn="ctr"/>
-                <a:endParaRPr lang="en-US" sz="1200" dirty="0"/>
-              </a:p>
-            </p:txBody>
-          </p:sp>
-          <p:sp>
-            <p:nvSpPr>
-              <p:cNvPr id="41" name="Rounded Rectangle 40"/>
-              <p:cNvSpPr/>
-              <p:nvPr/>
-            </p:nvSpPr>
-            <p:spPr>
-              <a:xfrm>
-                <a:off x="4489811" y="2297932"/>
-                <a:ext cx="659161" cy="426843"/>
-              </a:xfrm>
-              <a:prstGeom prst="roundRect">
-                <a:avLst/>
-              </a:prstGeom>
-              <a:solidFill>
-                <a:schemeClr val="accent1">
-                  <a:lumMod val="75000"/>
-                </a:schemeClr>
-              </a:solidFill>
-            </p:spPr>
-            <p:style>
-              <a:lnRef idx="2">
-                <a:schemeClr val="accent1">
-                  <a:shade val="50000"/>
-                </a:schemeClr>
-              </a:lnRef>
-              <a:fillRef idx="1">
-                <a:schemeClr val="accent1"/>
-              </a:fillRef>
-              <a:effectRef idx="0">
-                <a:schemeClr val="accent1"/>
-              </a:effectRef>
-              <a:fontRef idx="minor">
-                <a:schemeClr val="lt1"/>
-              </a:fontRef>
-            </p:style>
-            <p:txBody>
-              <a:bodyPr rtlCol="0" anchor="ctr"/>
-              <a:lstStyle/>
-              <a:p>
-                <a:pPr algn="ctr"/>
-                <a:endParaRPr lang="en-US" sz="1200" dirty="0"/>
-              </a:p>
-            </p:txBody>
-          </p:sp>
-          <p:sp>
-            <p:nvSpPr>
-              <p:cNvPr id="42" name="Rounded Rectangle 41"/>
-              <p:cNvSpPr/>
-              <p:nvPr/>
-            </p:nvSpPr>
-            <p:spPr>
-              <a:xfrm>
-                <a:off x="3430976" y="3115980"/>
-                <a:ext cx="659161" cy="426843"/>
-              </a:xfrm>
-              <a:prstGeom prst="roundRect">
-                <a:avLst/>
-              </a:prstGeom>
-              <a:solidFill>
-                <a:schemeClr val="accent1">
-                  <a:lumMod val="75000"/>
-                </a:schemeClr>
-              </a:solidFill>
-            </p:spPr>
-            <p:style>
-              <a:lnRef idx="2">
-                <a:schemeClr val="accent1">
-                  <a:shade val="50000"/>
-                </a:schemeClr>
-              </a:lnRef>
-              <a:fillRef idx="1">
-                <a:schemeClr val="accent1"/>
-              </a:fillRef>
-              <a:effectRef idx="0">
-                <a:schemeClr val="accent1"/>
-              </a:effectRef>
-              <a:fontRef idx="minor">
-                <a:schemeClr val="lt1"/>
-              </a:fontRef>
-            </p:style>
-            <p:txBody>
-              <a:bodyPr rtlCol="0" anchor="ctr"/>
-              <a:lstStyle/>
-              <a:p>
-                <a:pPr algn="ctr"/>
-                <a:endParaRPr lang="en-US" sz="1200" dirty="0"/>
-              </a:p>
-            </p:txBody>
-          </p:sp>
-          <p:sp>
-            <p:nvSpPr>
-              <p:cNvPr id="43" name="Rounded Rectangle 42"/>
-              <p:cNvSpPr/>
-              <p:nvPr/>
-            </p:nvSpPr>
-            <p:spPr>
-              <a:xfrm>
-                <a:off x="4224260" y="3103921"/>
-                <a:ext cx="659161" cy="426843"/>
-              </a:xfrm>
-              <a:prstGeom prst="roundRect">
-                <a:avLst/>
-              </a:prstGeom>
-              <a:solidFill>
-                <a:schemeClr val="accent1">
-                  <a:lumMod val="75000"/>
-                </a:schemeClr>
-              </a:solidFill>
-            </p:spPr>
-            <p:style>
-              <a:lnRef idx="2">
-                <a:schemeClr val="accent1">
-                  <a:shade val="50000"/>
-                </a:schemeClr>
-              </a:lnRef>
-              <a:fillRef idx="1">
-                <a:schemeClr val="accent1"/>
-              </a:fillRef>
-              <a:effectRef idx="0">
-                <a:schemeClr val="accent1"/>
-              </a:effectRef>
-              <a:fontRef idx="minor">
-                <a:schemeClr val="lt1"/>
-              </a:fontRef>
-            </p:style>
-            <p:txBody>
-              <a:bodyPr rtlCol="0" anchor="ctr"/>
-              <a:lstStyle/>
-              <a:p>
-                <a:pPr algn="ctr"/>
-                <a:endParaRPr lang="en-US" sz="1200" dirty="0"/>
-              </a:p>
-            </p:txBody>
-          </p:sp>
-        </p:grpSp>
-        <p:sp>
-          <p:nvSpPr>
-            <p:cNvPr id="45" name="Oval 44"/>
-            <p:cNvSpPr/>
-            <p:nvPr/>
-          </p:nvSpPr>
-          <p:spPr>
-            <a:xfrm>
-              <a:off x="3764669" y="2308373"/>
-              <a:ext cx="329581" cy="202980"/>
-            </a:xfrm>
-            <a:prstGeom prst="ellipse">
-              <a:avLst/>
-            </a:prstGeom>
-          </p:spPr>
-          <p:style>
-            <a:lnRef idx="2">
-              <a:schemeClr val="accent1">
-                <a:shade val="50000"/>
-              </a:schemeClr>
-            </a:lnRef>
-            <a:fillRef idx="1">
-              <a:schemeClr val="accent1"/>
-            </a:fillRef>
-            <a:effectRef idx="0">
-              <a:schemeClr val="accent1"/>
-            </a:effectRef>
-            <a:fontRef idx="minor">
-              <a:schemeClr val="lt1"/>
-            </a:fontRef>
-          </p:style>
-          <p:txBody>
-            <a:bodyPr rtlCol="0" anchor="ctr"/>
-            <a:lstStyle/>
-            <a:p>
-              <a:pPr algn="ctr"/>
-              <a:endParaRPr lang="en-US" sz="800" dirty="0"/>
-            </a:p>
-          </p:txBody>
-        </p:sp>
-        <p:sp>
-          <p:nvSpPr>
-            <p:cNvPr id="47" name="Oval 46"/>
-            <p:cNvSpPr/>
-            <p:nvPr/>
-          </p:nvSpPr>
-          <p:spPr>
-            <a:xfrm>
-              <a:off x="4007235" y="2470091"/>
-              <a:ext cx="329581" cy="202980"/>
-            </a:xfrm>
-            <a:prstGeom prst="ellipse">
-              <a:avLst/>
-            </a:prstGeom>
-          </p:spPr>
-          <p:style>
-            <a:lnRef idx="2">
-              <a:schemeClr val="accent1">
-                <a:shade val="50000"/>
-              </a:schemeClr>
-            </a:lnRef>
-            <a:fillRef idx="1">
-              <a:schemeClr val="accent1"/>
-            </a:fillRef>
-            <a:effectRef idx="0">
-              <a:schemeClr val="accent1"/>
-            </a:effectRef>
-            <a:fontRef idx="minor">
-              <a:schemeClr val="lt1"/>
-            </a:fontRef>
-          </p:style>
-          <p:txBody>
-            <a:bodyPr rtlCol="0" anchor="ctr"/>
-            <a:lstStyle/>
-            <a:p>
-              <a:pPr algn="ctr"/>
-              <a:endParaRPr lang="en-US" sz="800" dirty="0"/>
-            </a:p>
-          </p:txBody>
-        </p:sp>
-        <p:sp>
-          <p:nvSpPr>
-            <p:cNvPr id="48" name="Oval 47"/>
-            <p:cNvSpPr/>
-            <p:nvPr/>
-          </p:nvSpPr>
-          <p:spPr>
-            <a:xfrm>
-              <a:off x="4536005" y="2334225"/>
-              <a:ext cx="329581" cy="202980"/>
-            </a:xfrm>
-            <a:prstGeom prst="ellipse">
-              <a:avLst/>
-            </a:prstGeom>
-          </p:spPr>
-          <p:style>
-            <a:lnRef idx="2">
-              <a:schemeClr val="accent1">
-                <a:shade val="50000"/>
-              </a:schemeClr>
-            </a:lnRef>
-            <a:fillRef idx="1">
-              <a:schemeClr val="accent1"/>
-            </a:fillRef>
-            <a:effectRef idx="0">
-              <a:schemeClr val="accent1"/>
-            </a:effectRef>
-            <a:fontRef idx="minor">
-              <a:schemeClr val="lt1"/>
-            </a:fontRef>
-          </p:style>
-          <p:txBody>
-            <a:bodyPr rtlCol="0" anchor="ctr"/>
-            <a:lstStyle/>
-            <a:p>
-              <a:pPr algn="ctr"/>
-              <a:endParaRPr lang="en-US" sz="800" dirty="0"/>
-            </a:p>
-          </p:txBody>
-        </p:sp>
-        <p:sp>
-          <p:nvSpPr>
-            <p:cNvPr id="49" name="Oval 48"/>
-            <p:cNvSpPr/>
-            <p:nvPr/>
-          </p:nvSpPr>
-          <p:spPr>
-            <a:xfrm>
-              <a:off x="4782684" y="2495943"/>
-              <a:ext cx="329581" cy="202980"/>
-            </a:xfrm>
-            <a:prstGeom prst="ellipse">
-              <a:avLst/>
-            </a:prstGeom>
-          </p:spPr>
-          <p:style>
-            <a:lnRef idx="2">
-              <a:schemeClr val="accent1">
-                <a:shade val="50000"/>
-              </a:schemeClr>
-            </a:lnRef>
-            <a:fillRef idx="1">
-              <a:schemeClr val="accent1"/>
-            </a:fillRef>
-            <a:effectRef idx="0">
-              <a:schemeClr val="accent1"/>
-            </a:effectRef>
-            <a:fontRef idx="minor">
-              <a:schemeClr val="lt1"/>
-            </a:fontRef>
-          </p:style>
-          <p:txBody>
-            <a:bodyPr rtlCol="0" anchor="ctr"/>
-            <a:lstStyle/>
-            <a:p>
-              <a:pPr algn="ctr"/>
-              <a:endParaRPr lang="en-US" sz="800" dirty="0"/>
-            </a:p>
-          </p:txBody>
-        </p:sp>
-        <p:sp>
-          <p:nvSpPr>
-            <p:cNvPr id="50" name="Oval 49"/>
-            <p:cNvSpPr/>
-            <p:nvPr/>
-          </p:nvSpPr>
-          <p:spPr>
-            <a:xfrm>
-              <a:off x="3483545" y="3142279"/>
-              <a:ext cx="329581" cy="202980"/>
-            </a:xfrm>
-            <a:prstGeom prst="ellipse">
-              <a:avLst/>
-            </a:prstGeom>
-          </p:spPr>
-          <p:style>
-            <a:lnRef idx="2">
-              <a:schemeClr val="accent1">
-                <a:shade val="50000"/>
-              </a:schemeClr>
-            </a:lnRef>
-            <a:fillRef idx="1">
-              <a:schemeClr val="accent1"/>
-            </a:fillRef>
-            <a:effectRef idx="0">
-              <a:schemeClr val="accent1"/>
-            </a:effectRef>
-            <a:fontRef idx="minor">
-              <a:schemeClr val="lt1"/>
-            </a:fontRef>
-          </p:style>
-          <p:txBody>
-            <a:bodyPr rtlCol="0" anchor="ctr"/>
-            <a:lstStyle/>
-            <a:p>
-              <a:pPr algn="ctr"/>
-              <a:endParaRPr lang="en-US" sz="800" dirty="0"/>
-            </a:p>
-          </p:txBody>
-        </p:sp>
-        <p:sp>
-          <p:nvSpPr>
-            <p:cNvPr id="51" name="Oval 50"/>
-            <p:cNvSpPr/>
-            <p:nvPr/>
-          </p:nvSpPr>
-          <p:spPr>
-            <a:xfrm>
-              <a:off x="3730224" y="3303997"/>
-              <a:ext cx="329581" cy="202980"/>
-            </a:xfrm>
-            <a:prstGeom prst="ellipse">
-              <a:avLst/>
-            </a:prstGeom>
-          </p:spPr>
-          <p:style>
-            <a:lnRef idx="2">
-              <a:schemeClr val="accent1">
-                <a:shade val="50000"/>
-              </a:schemeClr>
-            </a:lnRef>
-            <a:fillRef idx="1">
-              <a:schemeClr val="accent1"/>
-            </a:fillRef>
-            <a:effectRef idx="0">
-              <a:schemeClr val="accent1"/>
-            </a:effectRef>
-            <a:fontRef idx="minor">
-              <a:schemeClr val="lt1"/>
-            </a:fontRef>
-          </p:style>
-          <p:txBody>
-            <a:bodyPr rtlCol="0" anchor="ctr"/>
-            <a:lstStyle/>
-            <a:p>
-              <a:pPr algn="ctr"/>
-              <a:endParaRPr lang="en-US" sz="800" dirty="0"/>
-            </a:p>
-          </p:txBody>
-        </p:sp>
-        <p:sp>
-          <p:nvSpPr>
-            <p:cNvPr id="52" name="Oval 51"/>
-            <p:cNvSpPr/>
-            <p:nvPr/>
-          </p:nvSpPr>
-          <p:spPr>
-            <a:xfrm>
-              <a:off x="4278178" y="3139818"/>
-              <a:ext cx="329581" cy="202980"/>
-            </a:xfrm>
-            <a:prstGeom prst="ellipse">
-              <a:avLst/>
-            </a:prstGeom>
-          </p:spPr>
-          <p:style>
-            <a:lnRef idx="2">
-              <a:schemeClr val="accent1">
-                <a:shade val="50000"/>
-              </a:schemeClr>
-            </a:lnRef>
-            <a:fillRef idx="1">
-              <a:schemeClr val="accent1"/>
-            </a:fillRef>
-            <a:effectRef idx="0">
-              <a:schemeClr val="accent1"/>
-            </a:effectRef>
-            <a:fontRef idx="minor">
-              <a:schemeClr val="lt1"/>
-            </a:fontRef>
-          </p:style>
-          <p:txBody>
-            <a:bodyPr rtlCol="0" anchor="ctr"/>
-            <a:lstStyle/>
-            <a:p>
-              <a:pPr algn="ctr"/>
-              <a:endParaRPr lang="en-US" sz="800" dirty="0"/>
-            </a:p>
-          </p:txBody>
-        </p:sp>
-        <p:sp>
-          <p:nvSpPr>
-            <p:cNvPr id="53" name="Oval 52"/>
-            <p:cNvSpPr/>
-            <p:nvPr/>
-          </p:nvSpPr>
-          <p:spPr>
-            <a:xfrm>
-              <a:off x="4524857" y="3301536"/>
-              <a:ext cx="329581" cy="202980"/>
-            </a:xfrm>
-            <a:prstGeom prst="ellipse">
-              <a:avLst/>
-            </a:prstGeom>
-          </p:spPr>
-          <p:style>
-            <a:lnRef idx="2">
-              <a:schemeClr val="accent1">
-                <a:shade val="50000"/>
-              </a:schemeClr>
-            </a:lnRef>
-            <a:fillRef idx="1">
-              <a:schemeClr val="accent1"/>
-            </a:fillRef>
-            <a:effectRef idx="0">
-              <a:schemeClr val="accent1"/>
-            </a:effectRef>
-            <a:fontRef idx="minor">
-              <a:schemeClr val="lt1"/>
-            </a:fontRef>
-          </p:style>
-          <p:txBody>
-            <a:bodyPr rtlCol="0" anchor="ctr"/>
-            <a:lstStyle/>
-            <a:p>
-              <a:pPr algn="ctr"/>
-              <a:endParaRPr lang="en-US" sz="800" dirty="0"/>
-            </a:p>
-          </p:txBody>
-        </p:sp>
-      </p:grpSp>
+          </a:xfrm>
+          <a:prstGeom prst="rect">
+            <a:avLst/>
+          </a:prstGeom>
+          <a:solidFill>
+            <a:schemeClr val="accent1">
+              <a:lumMod val="20000"/>
+              <a:lumOff val="80000"/>
+            </a:schemeClr>
+          </a:solidFill>
+        </p:spPr>
+        <p:style>
+          <a:lnRef idx="2">
+            <a:schemeClr val="accent1">
+              <a:shade val="50000"/>
+            </a:schemeClr>
+          </a:lnRef>
+          <a:fillRef idx="1">
+            <a:schemeClr val="accent1"/>
+          </a:fillRef>
+          <a:effectRef idx="0">
+            <a:schemeClr val="accent1"/>
+          </a:effectRef>
+          <a:fontRef idx="minor">
+            <a:schemeClr val="lt1"/>
+          </a:fontRef>
+        </p:style>
+        <p:txBody>
+          <a:bodyPr rtlCol="0" anchor="ctr"/>
+          <a:lstStyle/>
+          <a:p>
+            <a:pPr algn="ctr"/>
+            <a:endParaRPr lang="en-US" sz="1200"/>
+          </a:p>
+        </p:txBody>
+      </p:sp>
+      <p:sp>
+        <p:nvSpPr>
+          <p:cNvPr id="29" name="TextBox 28"/>
+          <p:cNvSpPr txBox="1">
+            <a:spLocks/>
+          </p:cNvSpPr>
+          <p:nvPr/>
+        </p:nvSpPr>
+        <p:spPr>
+          <a:xfrm>
+            <a:off x="1961567" y="516366"/>
+            <a:ext cx="2216075" cy="276999"/>
+          </a:xfrm>
+          <a:prstGeom prst="rect">
+            <a:avLst/>
+          </a:prstGeom>
+          <a:noFill/>
+        </p:spPr>
+        <p:txBody>
+          <a:bodyPr wrap="square" rtlCol="0">
+            <a:spAutoFit/>
+          </a:bodyPr>
+          <a:lstStyle/>
+          <a:p>
+            <a:r>
+              <a:rPr lang="en-US" sz="1200" dirty="0" err="1"/>
+              <a:t>MeasureReport</a:t>
+            </a:r>
+            <a:r>
+              <a:rPr lang="en-US" sz="1200" dirty="0"/>
+              <a:t> – Subject-List</a:t>
+            </a:r>
+          </a:p>
+        </p:txBody>
+      </p:sp>
+      <p:sp>
+        <p:nvSpPr>
+          <p:cNvPr id="30" name="Rectangle 29"/>
+          <p:cNvSpPr/>
+          <p:nvPr/>
+        </p:nvSpPr>
+        <p:spPr>
+          <a:xfrm>
+            <a:off x="2188027" y="776608"/>
+            <a:ext cx="1989615" cy="1909445"/>
+          </a:xfrm>
+          <a:prstGeom prst="rect">
+            <a:avLst/>
+          </a:prstGeom>
+          <a:solidFill>
+            <a:schemeClr val="accent1">
+              <a:lumMod val="40000"/>
+              <a:lumOff val="60000"/>
+            </a:schemeClr>
+          </a:solidFill>
+        </p:spPr>
+        <p:style>
+          <a:lnRef idx="2">
+            <a:schemeClr val="accent1">
+              <a:shade val="50000"/>
+            </a:schemeClr>
+          </a:lnRef>
+          <a:fillRef idx="1">
+            <a:schemeClr val="accent1"/>
+          </a:fillRef>
+          <a:effectRef idx="0">
+            <a:schemeClr val="accent1"/>
+          </a:effectRef>
+          <a:fontRef idx="minor">
+            <a:schemeClr val="lt1"/>
+          </a:fontRef>
+        </p:style>
+        <p:txBody>
+          <a:bodyPr rtlCol="0" anchor="ctr"/>
+          <a:lstStyle/>
+          <a:p>
+            <a:pPr algn="ctr"/>
+            <a:endParaRPr lang="en-US" sz="1200" dirty="0"/>
+          </a:p>
+        </p:txBody>
+      </p:sp>
+      <p:sp>
+        <p:nvSpPr>
+          <p:cNvPr id="31" name="TextBox 30"/>
+          <p:cNvSpPr txBox="1"/>
+          <p:nvPr/>
+        </p:nvSpPr>
+        <p:spPr>
+          <a:xfrm>
+            <a:off x="2188026" y="776607"/>
+            <a:ext cx="1989615" cy="241936"/>
+          </a:xfrm>
+          <a:prstGeom prst="rect">
+            <a:avLst/>
+          </a:prstGeom>
+          <a:noFill/>
+        </p:spPr>
+        <p:txBody>
+          <a:bodyPr wrap="square" rtlCol="0">
+            <a:spAutoFit/>
+          </a:bodyPr>
+          <a:lstStyle/>
+          <a:p>
+            <a:r>
+              <a:rPr lang="en-US" sz="1200" dirty="0"/>
+              <a:t>Population Group</a:t>
+            </a:r>
+          </a:p>
+        </p:txBody>
+      </p:sp>
+      <p:sp>
+        <p:nvSpPr>
+          <p:cNvPr id="32" name="Rectangle 31"/>
+          <p:cNvSpPr/>
+          <p:nvPr/>
+        </p:nvSpPr>
+        <p:spPr>
+          <a:xfrm>
+            <a:off x="2463014" y="1025019"/>
+            <a:ext cx="1714627" cy="816210"/>
+          </a:xfrm>
+          <a:prstGeom prst="rect">
+            <a:avLst/>
+          </a:prstGeom>
+          <a:solidFill>
+            <a:schemeClr val="accent1">
+              <a:lumMod val="60000"/>
+              <a:lumOff val="40000"/>
+            </a:schemeClr>
+          </a:solidFill>
+        </p:spPr>
+        <p:style>
+          <a:lnRef idx="2">
+            <a:schemeClr val="accent1">
+              <a:shade val="50000"/>
+            </a:schemeClr>
+          </a:lnRef>
+          <a:fillRef idx="1">
+            <a:schemeClr val="accent1"/>
+          </a:fillRef>
+          <a:effectRef idx="0">
+            <a:schemeClr val="accent1"/>
+          </a:effectRef>
+          <a:fontRef idx="minor">
+            <a:schemeClr val="lt1"/>
+          </a:fontRef>
+        </p:style>
+        <p:txBody>
+          <a:bodyPr rtlCol="0" anchor="ctr"/>
+          <a:lstStyle/>
+          <a:p>
+            <a:pPr algn="ctr"/>
+            <a:endParaRPr lang="en-US" sz="1200"/>
+          </a:p>
+        </p:txBody>
+      </p:sp>
+      <p:sp>
+        <p:nvSpPr>
+          <p:cNvPr id="33" name="TextBox 32"/>
+          <p:cNvSpPr txBox="1"/>
+          <p:nvPr/>
+        </p:nvSpPr>
+        <p:spPr>
+          <a:xfrm>
+            <a:off x="2463014" y="1036848"/>
+            <a:ext cx="1714628" cy="241936"/>
+          </a:xfrm>
+          <a:prstGeom prst="rect">
+            <a:avLst/>
+          </a:prstGeom>
+          <a:noFill/>
+        </p:spPr>
+        <p:txBody>
+          <a:bodyPr wrap="square" rtlCol="0">
+            <a:spAutoFit/>
+          </a:bodyPr>
+          <a:lstStyle/>
+          <a:p>
+            <a:r>
+              <a:rPr lang="en-US" sz="1200" dirty="0"/>
+              <a:t>Populations</a:t>
+            </a:r>
+          </a:p>
+        </p:txBody>
+      </p:sp>
+      <p:sp>
+        <p:nvSpPr>
+          <p:cNvPr id="34" name="Rectangle 33"/>
+          <p:cNvSpPr/>
+          <p:nvPr/>
+        </p:nvSpPr>
+        <p:spPr>
+          <a:xfrm>
+            <a:off x="2463014" y="1921110"/>
+            <a:ext cx="1714628" cy="764942"/>
+          </a:xfrm>
+          <a:prstGeom prst="rect">
+            <a:avLst/>
+          </a:prstGeom>
+          <a:solidFill>
+            <a:schemeClr val="accent1">
+              <a:lumMod val="60000"/>
+              <a:lumOff val="40000"/>
+            </a:schemeClr>
+          </a:solidFill>
+        </p:spPr>
+        <p:style>
+          <a:lnRef idx="2">
+            <a:schemeClr val="accent1">
+              <a:shade val="50000"/>
+            </a:schemeClr>
+          </a:lnRef>
+          <a:fillRef idx="1">
+            <a:schemeClr val="accent1"/>
+          </a:fillRef>
+          <a:effectRef idx="0">
+            <a:schemeClr val="accent1"/>
+          </a:effectRef>
+          <a:fontRef idx="minor">
+            <a:schemeClr val="lt1"/>
+          </a:fontRef>
+        </p:style>
+        <p:txBody>
+          <a:bodyPr rtlCol="0" anchor="ctr"/>
+          <a:lstStyle/>
+          <a:p>
+            <a:pPr algn="ctr"/>
+            <a:endParaRPr lang="en-US" sz="1200"/>
+          </a:p>
+        </p:txBody>
+      </p:sp>
+      <p:sp>
+        <p:nvSpPr>
+          <p:cNvPr id="35" name="TextBox 34"/>
+          <p:cNvSpPr txBox="1"/>
+          <p:nvPr/>
+        </p:nvSpPr>
+        <p:spPr>
+          <a:xfrm>
+            <a:off x="2463014" y="1937346"/>
+            <a:ext cx="1714628" cy="241936"/>
+          </a:xfrm>
+          <a:prstGeom prst="rect">
+            <a:avLst/>
+          </a:prstGeom>
+          <a:noFill/>
+        </p:spPr>
+        <p:txBody>
+          <a:bodyPr wrap="square" rtlCol="0">
+            <a:spAutoFit/>
+          </a:bodyPr>
+          <a:lstStyle/>
+          <a:p>
+            <a:r>
+              <a:rPr lang="en-US" sz="1200" dirty="0" err="1"/>
+              <a:t>Stratifiers</a:t>
+            </a:r>
+            <a:endParaRPr lang="en-US" sz="1200" dirty="0"/>
+          </a:p>
+        </p:txBody>
+      </p:sp>
+      <p:sp>
+        <p:nvSpPr>
+          <p:cNvPr id="36" name="Rectangle 35"/>
+          <p:cNvSpPr/>
+          <p:nvPr/>
+        </p:nvSpPr>
+        <p:spPr>
+          <a:xfrm>
+            <a:off x="2179940" y="2763012"/>
+            <a:ext cx="1997702" cy="722465"/>
+          </a:xfrm>
+          <a:prstGeom prst="rect">
+            <a:avLst/>
+          </a:prstGeom>
+          <a:solidFill>
+            <a:schemeClr val="accent1">
+              <a:lumMod val="40000"/>
+              <a:lumOff val="60000"/>
+            </a:schemeClr>
+          </a:solidFill>
+        </p:spPr>
+        <p:style>
+          <a:lnRef idx="2">
+            <a:schemeClr val="accent1">
+              <a:shade val="50000"/>
+            </a:schemeClr>
+          </a:lnRef>
+          <a:fillRef idx="1">
+            <a:schemeClr val="accent1"/>
+          </a:fillRef>
+          <a:effectRef idx="0">
+            <a:schemeClr val="accent1"/>
+          </a:effectRef>
+          <a:fontRef idx="minor">
+            <a:schemeClr val="lt1"/>
+          </a:fontRef>
+        </p:style>
+        <p:txBody>
+          <a:bodyPr rtlCol="0" anchor="ctr"/>
+          <a:lstStyle/>
+          <a:p>
+            <a:pPr algn="ctr"/>
+            <a:endParaRPr lang="en-US" sz="1200"/>
+          </a:p>
+        </p:txBody>
+      </p:sp>
+      <p:sp>
+        <p:nvSpPr>
+          <p:cNvPr id="37" name="TextBox 36"/>
+          <p:cNvSpPr txBox="1"/>
+          <p:nvPr/>
+        </p:nvSpPr>
+        <p:spPr>
+          <a:xfrm>
+            <a:off x="2179939" y="2771252"/>
+            <a:ext cx="1997702" cy="241936"/>
+          </a:xfrm>
+          <a:prstGeom prst="rect">
+            <a:avLst/>
+          </a:prstGeom>
+          <a:noFill/>
+        </p:spPr>
+        <p:txBody>
+          <a:bodyPr wrap="square" rtlCol="0">
+            <a:spAutoFit/>
+          </a:bodyPr>
+          <a:lstStyle/>
+          <a:p>
+            <a:r>
+              <a:rPr lang="en-US" sz="1200" dirty="0"/>
+              <a:t>Supplemental Data</a:t>
+            </a:r>
+          </a:p>
+        </p:txBody>
+      </p:sp>
+      <p:sp>
+        <p:nvSpPr>
+          <p:cNvPr id="38" name="Rounded Rectangle 37"/>
+          <p:cNvSpPr/>
+          <p:nvPr/>
+        </p:nvSpPr>
+        <p:spPr>
+          <a:xfrm>
+            <a:off x="2588376" y="1297101"/>
+            <a:ext cx="659161" cy="426843"/>
+          </a:xfrm>
+          <a:prstGeom prst="roundRect">
+            <a:avLst/>
+          </a:prstGeom>
+          <a:solidFill>
+            <a:schemeClr val="accent1">
+              <a:lumMod val="75000"/>
+            </a:schemeClr>
+          </a:solidFill>
+        </p:spPr>
+        <p:style>
+          <a:lnRef idx="2">
+            <a:schemeClr val="accent1">
+              <a:shade val="50000"/>
+            </a:schemeClr>
+          </a:lnRef>
+          <a:fillRef idx="1">
+            <a:schemeClr val="accent1"/>
+          </a:fillRef>
+          <a:effectRef idx="0">
+            <a:schemeClr val="accent1"/>
+          </a:effectRef>
+          <a:fontRef idx="minor">
+            <a:schemeClr val="lt1"/>
+          </a:fontRef>
+        </p:style>
+        <p:txBody>
+          <a:bodyPr rtlCol="0" anchor="ctr"/>
+          <a:lstStyle/>
+          <a:p>
+            <a:pPr algn="ctr"/>
+            <a:r>
+              <a:rPr lang="en-US" sz="1200" dirty="0"/>
+              <a:t>500</a:t>
+            </a:r>
+          </a:p>
+        </p:txBody>
+      </p:sp>
+      <p:sp>
+        <p:nvSpPr>
+          <p:cNvPr id="39" name="Rounded Rectangle 38"/>
+          <p:cNvSpPr/>
+          <p:nvPr/>
+        </p:nvSpPr>
+        <p:spPr>
+          <a:xfrm>
+            <a:off x="3372898" y="1304487"/>
+            <a:ext cx="659161" cy="426843"/>
+          </a:xfrm>
+          <a:prstGeom prst="roundRect">
+            <a:avLst/>
+          </a:prstGeom>
+          <a:solidFill>
+            <a:schemeClr val="accent1">
+              <a:lumMod val="75000"/>
+            </a:schemeClr>
+          </a:solidFill>
+        </p:spPr>
+        <p:style>
+          <a:lnRef idx="2">
+            <a:schemeClr val="accent1">
+              <a:shade val="50000"/>
+            </a:schemeClr>
+          </a:lnRef>
+          <a:fillRef idx="1">
+            <a:schemeClr val="accent1"/>
+          </a:fillRef>
+          <a:effectRef idx="0">
+            <a:schemeClr val="accent1"/>
+          </a:effectRef>
+          <a:fontRef idx="minor">
+            <a:schemeClr val="lt1"/>
+          </a:fontRef>
+        </p:style>
+        <p:txBody>
+          <a:bodyPr rtlCol="0" anchor="ctr"/>
+          <a:lstStyle/>
+          <a:p>
+            <a:pPr algn="ctr"/>
+            <a:r>
+              <a:rPr lang="en-US" sz="1200" dirty="0"/>
+              <a:t>250</a:t>
+            </a:r>
+          </a:p>
+        </p:txBody>
+      </p:sp>
+      <p:sp>
+        <p:nvSpPr>
+          <p:cNvPr id="40" name="Rounded Rectangle 39"/>
+          <p:cNvSpPr/>
+          <p:nvPr/>
+        </p:nvSpPr>
+        <p:spPr>
+          <a:xfrm>
+            <a:off x="2588376" y="2161455"/>
+            <a:ext cx="659161" cy="426843"/>
+          </a:xfrm>
+          <a:prstGeom prst="roundRect">
+            <a:avLst/>
+          </a:prstGeom>
+          <a:solidFill>
+            <a:schemeClr val="accent1">
+              <a:lumMod val="75000"/>
+            </a:schemeClr>
+          </a:solidFill>
+        </p:spPr>
+        <p:style>
+          <a:lnRef idx="2">
+            <a:schemeClr val="accent1">
+              <a:shade val="50000"/>
+            </a:schemeClr>
+          </a:lnRef>
+          <a:fillRef idx="1">
+            <a:schemeClr val="accent1"/>
+          </a:fillRef>
+          <a:effectRef idx="0">
+            <a:schemeClr val="accent1"/>
+          </a:effectRef>
+          <a:fontRef idx="minor">
+            <a:schemeClr val="lt1"/>
+          </a:fontRef>
+        </p:style>
+        <p:txBody>
+          <a:bodyPr rtlCol="0" anchor="ctr"/>
+          <a:lstStyle/>
+          <a:p>
+            <a:pPr algn="ctr"/>
+            <a:endParaRPr lang="en-US" sz="1200" dirty="0"/>
+          </a:p>
+        </p:txBody>
+      </p:sp>
+      <p:sp>
+        <p:nvSpPr>
+          <p:cNvPr id="41" name="Rounded Rectangle 40"/>
+          <p:cNvSpPr/>
+          <p:nvPr/>
+        </p:nvSpPr>
+        <p:spPr>
+          <a:xfrm>
+            <a:off x="3372898" y="2168841"/>
+            <a:ext cx="659161" cy="426843"/>
+          </a:xfrm>
+          <a:prstGeom prst="roundRect">
+            <a:avLst/>
+          </a:prstGeom>
+          <a:solidFill>
+            <a:schemeClr val="accent1">
+              <a:lumMod val="75000"/>
+            </a:schemeClr>
+          </a:solidFill>
+        </p:spPr>
+        <p:style>
+          <a:lnRef idx="2">
+            <a:schemeClr val="accent1">
+              <a:shade val="50000"/>
+            </a:schemeClr>
+          </a:lnRef>
+          <a:fillRef idx="1">
+            <a:schemeClr val="accent1"/>
+          </a:fillRef>
+          <a:effectRef idx="0">
+            <a:schemeClr val="accent1"/>
+          </a:effectRef>
+          <a:fontRef idx="minor">
+            <a:schemeClr val="lt1"/>
+          </a:fontRef>
+        </p:style>
+        <p:txBody>
+          <a:bodyPr rtlCol="0" anchor="ctr"/>
+          <a:lstStyle/>
+          <a:p>
+            <a:pPr algn="ctr"/>
+            <a:endParaRPr lang="en-US" sz="1200" dirty="0"/>
+          </a:p>
+        </p:txBody>
+      </p:sp>
+      <p:sp>
+        <p:nvSpPr>
+          <p:cNvPr id="42" name="Rounded Rectangle 41"/>
+          <p:cNvSpPr/>
+          <p:nvPr/>
+        </p:nvSpPr>
+        <p:spPr>
+          <a:xfrm>
+            <a:off x="2314063" y="2986889"/>
+            <a:ext cx="659161" cy="426843"/>
+          </a:xfrm>
+          <a:prstGeom prst="roundRect">
+            <a:avLst/>
+          </a:prstGeom>
+          <a:solidFill>
+            <a:schemeClr val="accent1">
+              <a:lumMod val="75000"/>
+            </a:schemeClr>
+          </a:solidFill>
+        </p:spPr>
+        <p:style>
+          <a:lnRef idx="2">
+            <a:schemeClr val="accent1">
+              <a:shade val="50000"/>
+            </a:schemeClr>
+          </a:lnRef>
+          <a:fillRef idx="1">
+            <a:schemeClr val="accent1"/>
+          </a:fillRef>
+          <a:effectRef idx="0">
+            <a:schemeClr val="accent1"/>
+          </a:effectRef>
+          <a:fontRef idx="minor">
+            <a:schemeClr val="lt1"/>
+          </a:fontRef>
+        </p:style>
+        <p:txBody>
+          <a:bodyPr rtlCol="0" anchor="ctr"/>
+          <a:lstStyle/>
+          <a:p>
+            <a:pPr algn="ctr"/>
+            <a:endParaRPr lang="en-US" sz="1200" dirty="0"/>
+          </a:p>
+        </p:txBody>
+      </p:sp>
+      <p:sp>
+        <p:nvSpPr>
+          <p:cNvPr id="43" name="Rounded Rectangle 42"/>
+          <p:cNvSpPr/>
+          <p:nvPr/>
+        </p:nvSpPr>
+        <p:spPr>
+          <a:xfrm>
+            <a:off x="3107347" y="2974830"/>
+            <a:ext cx="659161" cy="426843"/>
+          </a:xfrm>
+          <a:prstGeom prst="roundRect">
+            <a:avLst/>
+          </a:prstGeom>
+          <a:solidFill>
+            <a:schemeClr val="accent1">
+              <a:lumMod val="75000"/>
+            </a:schemeClr>
+          </a:solidFill>
+        </p:spPr>
+        <p:style>
+          <a:lnRef idx="2">
+            <a:schemeClr val="accent1">
+              <a:shade val="50000"/>
+            </a:schemeClr>
+          </a:lnRef>
+          <a:fillRef idx="1">
+            <a:schemeClr val="accent1"/>
+          </a:fillRef>
+          <a:effectRef idx="0">
+            <a:schemeClr val="accent1"/>
+          </a:effectRef>
+          <a:fontRef idx="minor">
+            <a:schemeClr val="lt1"/>
+          </a:fontRef>
+        </p:style>
+        <p:txBody>
+          <a:bodyPr rtlCol="0" anchor="ctr"/>
+          <a:lstStyle/>
+          <a:p>
+            <a:pPr algn="ctr"/>
+            <a:endParaRPr lang="en-US" sz="1200" dirty="0"/>
+          </a:p>
+        </p:txBody>
+      </p:sp>
+      <p:sp>
+        <p:nvSpPr>
+          <p:cNvPr id="45" name="Oval 44"/>
+          <p:cNvSpPr/>
+          <p:nvPr/>
+        </p:nvSpPr>
+        <p:spPr>
+          <a:xfrm>
+            <a:off x="2647756" y="2179282"/>
+            <a:ext cx="329581" cy="202980"/>
+          </a:xfrm>
+          <a:prstGeom prst="ellipse">
+            <a:avLst/>
+          </a:prstGeom>
+        </p:spPr>
+        <p:style>
+          <a:lnRef idx="2">
+            <a:schemeClr val="accent1">
+              <a:shade val="50000"/>
+            </a:schemeClr>
+          </a:lnRef>
+          <a:fillRef idx="1">
+            <a:schemeClr val="accent1"/>
+          </a:fillRef>
+          <a:effectRef idx="0">
+            <a:schemeClr val="accent1"/>
+          </a:effectRef>
+          <a:fontRef idx="minor">
+            <a:schemeClr val="lt1"/>
+          </a:fontRef>
+        </p:style>
+        <p:txBody>
+          <a:bodyPr rtlCol="0" anchor="ctr"/>
+          <a:lstStyle/>
+          <a:p>
+            <a:pPr algn="ctr"/>
+            <a:endParaRPr lang="en-US" sz="800" dirty="0"/>
+          </a:p>
+        </p:txBody>
+      </p:sp>
+      <p:sp>
+        <p:nvSpPr>
+          <p:cNvPr id="47" name="Oval 46"/>
+          <p:cNvSpPr/>
+          <p:nvPr/>
+        </p:nvSpPr>
+        <p:spPr>
+          <a:xfrm>
+            <a:off x="2890322" y="2341000"/>
+            <a:ext cx="329581" cy="202980"/>
+          </a:xfrm>
+          <a:prstGeom prst="ellipse">
+            <a:avLst/>
+          </a:prstGeom>
+        </p:spPr>
+        <p:style>
+          <a:lnRef idx="2">
+            <a:schemeClr val="accent1">
+              <a:shade val="50000"/>
+            </a:schemeClr>
+          </a:lnRef>
+          <a:fillRef idx="1">
+            <a:schemeClr val="accent1"/>
+          </a:fillRef>
+          <a:effectRef idx="0">
+            <a:schemeClr val="accent1"/>
+          </a:effectRef>
+          <a:fontRef idx="minor">
+            <a:schemeClr val="lt1"/>
+          </a:fontRef>
+        </p:style>
+        <p:txBody>
+          <a:bodyPr rtlCol="0" anchor="ctr"/>
+          <a:lstStyle/>
+          <a:p>
+            <a:pPr algn="ctr"/>
+            <a:endParaRPr lang="en-US" sz="800" dirty="0"/>
+          </a:p>
+        </p:txBody>
+      </p:sp>
+      <p:sp>
+        <p:nvSpPr>
+          <p:cNvPr id="48" name="Oval 47"/>
+          <p:cNvSpPr/>
+          <p:nvPr/>
+        </p:nvSpPr>
+        <p:spPr>
+          <a:xfrm>
+            <a:off x="3419092" y="2205134"/>
+            <a:ext cx="329581" cy="202980"/>
+          </a:xfrm>
+          <a:prstGeom prst="ellipse">
+            <a:avLst/>
+          </a:prstGeom>
+        </p:spPr>
+        <p:style>
+          <a:lnRef idx="2">
+            <a:schemeClr val="accent1">
+              <a:shade val="50000"/>
+            </a:schemeClr>
+          </a:lnRef>
+          <a:fillRef idx="1">
+            <a:schemeClr val="accent1"/>
+          </a:fillRef>
+          <a:effectRef idx="0">
+            <a:schemeClr val="accent1"/>
+          </a:effectRef>
+          <a:fontRef idx="minor">
+            <a:schemeClr val="lt1"/>
+          </a:fontRef>
+        </p:style>
+        <p:txBody>
+          <a:bodyPr rtlCol="0" anchor="ctr"/>
+          <a:lstStyle/>
+          <a:p>
+            <a:pPr algn="ctr"/>
+            <a:endParaRPr lang="en-US" sz="800" dirty="0"/>
+          </a:p>
+        </p:txBody>
+      </p:sp>
+      <p:sp>
+        <p:nvSpPr>
+          <p:cNvPr id="49" name="Oval 48"/>
+          <p:cNvSpPr/>
+          <p:nvPr/>
+        </p:nvSpPr>
+        <p:spPr>
+          <a:xfrm>
+            <a:off x="3665771" y="2366852"/>
+            <a:ext cx="329581" cy="202980"/>
+          </a:xfrm>
+          <a:prstGeom prst="ellipse">
+            <a:avLst/>
+          </a:prstGeom>
+        </p:spPr>
+        <p:style>
+          <a:lnRef idx="2">
+            <a:schemeClr val="accent1">
+              <a:shade val="50000"/>
+            </a:schemeClr>
+          </a:lnRef>
+          <a:fillRef idx="1">
+            <a:schemeClr val="accent1"/>
+          </a:fillRef>
+          <a:effectRef idx="0">
+            <a:schemeClr val="accent1"/>
+          </a:effectRef>
+          <a:fontRef idx="minor">
+            <a:schemeClr val="lt1"/>
+          </a:fontRef>
+        </p:style>
+        <p:txBody>
+          <a:bodyPr rtlCol="0" anchor="ctr"/>
+          <a:lstStyle/>
+          <a:p>
+            <a:pPr algn="ctr"/>
+            <a:endParaRPr lang="en-US" sz="800" dirty="0"/>
+          </a:p>
+        </p:txBody>
+      </p:sp>
+      <p:sp>
+        <p:nvSpPr>
+          <p:cNvPr id="50" name="Oval 49"/>
+          <p:cNvSpPr/>
+          <p:nvPr/>
+        </p:nvSpPr>
+        <p:spPr>
+          <a:xfrm>
+            <a:off x="2366632" y="3013188"/>
+            <a:ext cx="329581" cy="202980"/>
+          </a:xfrm>
+          <a:prstGeom prst="ellipse">
+            <a:avLst/>
+          </a:prstGeom>
+        </p:spPr>
+        <p:style>
+          <a:lnRef idx="2">
+            <a:schemeClr val="accent1">
+              <a:shade val="50000"/>
+            </a:schemeClr>
+          </a:lnRef>
+          <a:fillRef idx="1">
+            <a:schemeClr val="accent1"/>
+          </a:fillRef>
+          <a:effectRef idx="0">
+            <a:schemeClr val="accent1"/>
+          </a:effectRef>
+          <a:fontRef idx="minor">
+            <a:schemeClr val="lt1"/>
+          </a:fontRef>
+        </p:style>
+        <p:txBody>
+          <a:bodyPr rtlCol="0" anchor="ctr"/>
+          <a:lstStyle/>
+          <a:p>
+            <a:pPr algn="ctr"/>
+            <a:endParaRPr lang="en-US" sz="800" dirty="0"/>
+          </a:p>
+        </p:txBody>
+      </p:sp>
+      <p:sp>
+        <p:nvSpPr>
+          <p:cNvPr id="51" name="Oval 50"/>
+          <p:cNvSpPr/>
+          <p:nvPr/>
+        </p:nvSpPr>
+        <p:spPr>
+          <a:xfrm>
+            <a:off x="2613311" y="3174906"/>
+            <a:ext cx="329581" cy="202980"/>
+          </a:xfrm>
+          <a:prstGeom prst="ellipse">
+            <a:avLst/>
+          </a:prstGeom>
+        </p:spPr>
+        <p:style>
+          <a:lnRef idx="2">
+            <a:schemeClr val="accent1">
+              <a:shade val="50000"/>
+            </a:schemeClr>
+          </a:lnRef>
+          <a:fillRef idx="1">
+            <a:schemeClr val="accent1"/>
+          </a:fillRef>
+          <a:effectRef idx="0">
+            <a:schemeClr val="accent1"/>
+          </a:effectRef>
+          <a:fontRef idx="minor">
+            <a:schemeClr val="lt1"/>
+          </a:fontRef>
+        </p:style>
+        <p:txBody>
+          <a:bodyPr rtlCol="0" anchor="ctr"/>
+          <a:lstStyle/>
+          <a:p>
+            <a:pPr algn="ctr"/>
+            <a:endParaRPr lang="en-US" sz="800" dirty="0"/>
+          </a:p>
+        </p:txBody>
+      </p:sp>
+      <p:sp>
+        <p:nvSpPr>
+          <p:cNvPr id="52" name="Oval 51"/>
+          <p:cNvSpPr/>
+          <p:nvPr/>
+        </p:nvSpPr>
+        <p:spPr>
+          <a:xfrm>
+            <a:off x="3161265" y="3010727"/>
+            <a:ext cx="329581" cy="202980"/>
+          </a:xfrm>
+          <a:prstGeom prst="ellipse">
+            <a:avLst/>
+          </a:prstGeom>
+        </p:spPr>
+        <p:style>
+          <a:lnRef idx="2">
+            <a:schemeClr val="accent1">
+              <a:shade val="50000"/>
+            </a:schemeClr>
+          </a:lnRef>
+          <a:fillRef idx="1">
+            <a:schemeClr val="accent1"/>
+          </a:fillRef>
+          <a:effectRef idx="0">
+            <a:schemeClr val="accent1"/>
+          </a:effectRef>
+          <a:fontRef idx="minor">
+            <a:schemeClr val="lt1"/>
+          </a:fontRef>
+        </p:style>
+        <p:txBody>
+          <a:bodyPr rtlCol="0" anchor="ctr"/>
+          <a:lstStyle/>
+          <a:p>
+            <a:pPr algn="ctr"/>
+            <a:endParaRPr lang="en-US" sz="800" dirty="0"/>
+          </a:p>
+        </p:txBody>
+      </p:sp>
+      <p:sp>
+        <p:nvSpPr>
+          <p:cNvPr id="53" name="Oval 52"/>
+          <p:cNvSpPr/>
+          <p:nvPr/>
+        </p:nvSpPr>
+        <p:spPr>
+          <a:xfrm>
+            <a:off x="3407944" y="3172445"/>
+            <a:ext cx="329581" cy="202980"/>
+          </a:xfrm>
+          <a:prstGeom prst="ellipse">
+            <a:avLst/>
+          </a:prstGeom>
+        </p:spPr>
+        <p:style>
+          <a:lnRef idx="2">
+            <a:schemeClr val="accent1">
+              <a:shade val="50000"/>
+            </a:schemeClr>
+          </a:lnRef>
+          <a:fillRef idx="1">
+            <a:schemeClr val="accent1"/>
+          </a:fillRef>
+          <a:effectRef idx="0">
+            <a:schemeClr val="accent1"/>
+          </a:effectRef>
+          <a:fontRef idx="minor">
+            <a:schemeClr val="lt1"/>
+          </a:fontRef>
+        </p:style>
+        <p:txBody>
+          <a:bodyPr rtlCol="0" anchor="ctr"/>
+          <a:lstStyle/>
+          <a:p>
+            <a:pPr algn="ctr"/>
+            <a:endParaRPr lang="en-US" sz="800" dirty="0"/>
+          </a:p>
+        </p:txBody>
+      </p:sp>
       <p:sp>
         <p:nvSpPr>
           <p:cNvPr id="2" name="TextBox 1"/>
@@ -17260,35 +17284,6 @@
       </p:grpSp>
       <p:sp>
         <p:nvSpPr>
-          <p:cNvPr id="16" name="TextBox 15"/>
-          <p:cNvSpPr txBox="1"/>
-          <p:nvPr/>
-        </p:nvSpPr>
-        <p:spPr>
-          <a:xfrm>
-            <a:off x="8101760" y="3959162"/>
-            <a:ext cx="946673" cy="369332"/>
-          </a:xfrm>
-          <a:prstGeom prst="rect">
-            <a:avLst/>
-          </a:prstGeom>
-          <a:noFill/>
-        </p:spPr>
-        <p:txBody>
-          <a:bodyPr wrap="square" rtlCol="0">
-            <a:spAutoFit/>
-          </a:bodyPr>
-          <a:lstStyle/>
-          <a:p>
-            <a:r>
-              <a:rPr lang="en-US" dirty="0"/>
-              <a:t>...</a:t>
-            </a:r>
-          </a:p>
-        </p:txBody>
-      </p:sp>
-      <p:sp>
-        <p:nvSpPr>
           <p:cNvPr id="18" name="Rectangle 17"/>
           <p:cNvSpPr/>
           <p:nvPr/>
@@ -17552,68 +17547,11 @@
           </a:p>
         </p:txBody>
       </p:sp>
-      <p:sp>
-        <p:nvSpPr>
-          <p:cNvPr id="154" name="TextBox 153"/>
-          <p:cNvSpPr txBox="1"/>
-          <p:nvPr/>
-        </p:nvSpPr>
-        <p:spPr>
-          <a:xfrm>
-            <a:off x="8664335" y="1283983"/>
-            <a:ext cx="946673" cy="369332"/>
-          </a:xfrm>
-          <a:prstGeom prst="rect">
-            <a:avLst/>
-          </a:prstGeom>
-          <a:noFill/>
-        </p:spPr>
-        <p:txBody>
-          <a:bodyPr wrap="square" rtlCol="0">
-            <a:spAutoFit/>
-          </a:bodyPr>
-          <a:lstStyle/>
-          <a:p>
-            <a:r>
-              <a:rPr lang="en-US" dirty="0"/>
-              <a:t>...</a:t>
-            </a:r>
-          </a:p>
-        </p:txBody>
-      </p:sp>
-      <p:sp>
-        <p:nvSpPr>
-          <p:cNvPr id="155" name="TextBox 154"/>
-          <p:cNvSpPr txBox="1"/>
-          <p:nvPr/>
-        </p:nvSpPr>
-        <p:spPr>
-          <a:xfrm>
-            <a:off x="8381030" y="2062596"/>
-            <a:ext cx="946673" cy="369332"/>
-          </a:xfrm>
-          <a:prstGeom prst="rect">
-            <a:avLst/>
-          </a:prstGeom>
-          <a:noFill/>
-        </p:spPr>
-        <p:txBody>
-          <a:bodyPr wrap="square" rtlCol="0">
-            <a:spAutoFit/>
-          </a:bodyPr>
-          <a:lstStyle/>
-          <a:p>
-            <a:r>
-              <a:rPr lang="en-US" dirty="0"/>
-              <a:t>...</a:t>
-            </a:r>
-          </a:p>
-        </p:txBody>
-      </p:sp>
       <p:cxnSp>
         <p:nvCxnSpPr>
           <p:cNvPr id="46" name="Elbow Connector 45"/>
           <p:cNvCxnSpPr>
+            <a:cxnSpLocks/>
             <a:stCxn id="33" idx="3"/>
             <a:endCxn id="18" idx="0"/>
           </p:cNvCxnSpPr>
@@ -17650,6 +17588,7 @@
         <p:nvCxnSpPr>
           <p:cNvPr id="157" name="Elbow Connector 156"/>
           <p:cNvCxnSpPr>
+            <a:cxnSpLocks/>
             <a:stCxn id="33" idx="3"/>
             <a:endCxn id="149" idx="0"/>
           </p:cNvCxnSpPr>
@@ -17686,6 +17625,7 @@
         <p:nvCxnSpPr>
           <p:cNvPr id="159" name="Elbow Connector 158"/>
           <p:cNvCxnSpPr>
+            <a:cxnSpLocks/>
             <a:stCxn id="33" idx="3"/>
             <a:endCxn id="151" idx="0"/>
           </p:cNvCxnSpPr>
@@ -17979,6 +17919,7 @@
         <p:nvCxnSpPr>
           <p:cNvPr id="242" name="Elbow Connector 241"/>
           <p:cNvCxnSpPr>
+            <a:cxnSpLocks/>
             <a:stCxn id="35" idx="3"/>
             <a:endCxn id="150" idx="0"/>
           </p:cNvCxnSpPr>
@@ -18015,6 +17956,7 @@
         <p:nvCxnSpPr>
           <p:cNvPr id="244" name="Elbow Connector 243"/>
           <p:cNvCxnSpPr>
+            <a:cxnSpLocks/>
             <a:stCxn id="35" idx="3"/>
             <a:endCxn id="152" idx="0"/>
           </p:cNvCxnSpPr>
@@ -18047,6 +17989,43 @@
           </a:fontRef>
         </p:style>
       </p:cxnSp>
+      <p:sp>
+        <p:nvSpPr>
+          <p:cNvPr id="5" name="TextBox 4">
+            <a:extLst>
+              <a:ext uri="{FF2B5EF4-FFF2-40B4-BE49-F238E27FC236}">
+                <a16:creationId xmlns:a16="http://schemas.microsoft.com/office/drawing/2014/main" id="{5494B833-4F69-F67E-C301-699F7E136F0B}"/>
+              </a:ext>
+            </a:extLst>
+          </p:cNvPr>
+          <p:cNvSpPr txBox="1"/>
+          <p:nvPr/>
+        </p:nvSpPr>
+        <p:spPr>
+          <a:xfrm>
+            <a:off x="5980583" y="786998"/>
+            <a:ext cx="1054741" cy="276999"/>
+          </a:xfrm>
+          <a:prstGeom prst="rect">
+            <a:avLst/>
+          </a:prstGeom>
+          <a:noFill/>
+        </p:spPr>
+        <p:txBody>
+          <a:bodyPr wrap="square" rtlCol="0">
+            <a:spAutoFit/>
+          </a:bodyPr>
+          <a:lstStyle/>
+          <a:p>
+            <a:r>
+              <a:rPr lang="en-US" sz="1200" dirty="0">
+                <a:latin typeface="Calibri" panose="020F0502020204030204" pitchFamily="34" charset="0"/>
+              </a:rPr>
+              <a:t>List Resources</a:t>
+            </a:r>
+          </a:p>
+        </p:txBody>
+      </p:sp>
     </p:spTree>
     <p:extLst>
       <p:ext uri="{BB962C8B-B14F-4D97-AF65-F5344CB8AC3E}">

</xml_diff>